<commit_message>
udpate report for progress
</commit_message>
<xml_diff>
--- a/doc/Report/Sep 26 2018.pptx
+++ b/doc/Report/Sep 26 2018.pptx
@@ -219,7 +219,7 @@
           <a:p>
             <a:fld id="{97BE2177-E45B-449F-AE2E-ED4743253C6D}" type="datetimeFigureOut">
               <a:rPr lang="zh-CN" altLang="en-US" smtClean="0"/>
-              <a:t>2018/9/27</a:t>
+              <a:t>2018/9/28</a:t>
             </a:fld>
             <a:endParaRPr lang="zh-CN" altLang="en-US"/>
           </a:p>
@@ -2061,7 +2061,7 @@
           <a:p>
             <a:fld id="{B9614994-C529-43AC-BD2C-52D47B0301A5}" type="datetimeFigureOut">
               <a:rPr lang="zh-CN" altLang="en-US" smtClean="0"/>
-              <a:t>2018/9/27</a:t>
+              <a:t>2018/9/28</a:t>
             </a:fld>
             <a:endParaRPr lang="zh-CN" altLang="en-US"/>
           </a:p>
@@ -2259,7 +2259,7 @@
           <a:p>
             <a:fld id="{B9614994-C529-43AC-BD2C-52D47B0301A5}" type="datetimeFigureOut">
               <a:rPr lang="zh-CN" altLang="en-US" smtClean="0"/>
-              <a:t>2018/9/27</a:t>
+              <a:t>2018/9/28</a:t>
             </a:fld>
             <a:endParaRPr lang="zh-CN" altLang="en-US"/>
           </a:p>
@@ -2467,7 +2467,7 @@
           <a:p>
             <a:fld id="{B9614994-C529-43AC-BD2C-52D47B0301A5}" type="datetimeFigureOut">
               <a:rPr lang="zh-CN" altLang="en-US" smtClean="0"/>
-              <a:t>2018/9/27</a:t>
+              <a:t>2018/9/28</a:t>
             </a:fld>
             <a:endParaRPr lang="zh-CN" altLang="en-US"/>
           </a:p>
@@ -2665,7 +2665,7 @@
           <a:p>
             <a:fld id="{B9614994-C529-43AC-BD2C-52D47B0301A5}" type="datetimeFigureOut">
               <a:rPr lang="zh-CN" altLang="en-US" smtClean="0"/>
-              <a:t>2018/9/27</a:t>
+              <a:t>2018/9/28</a:t>
             </a:fld>
             <a:endParaRPr lang="zh-CN" altLang="en-US"/>
           </a:p>
@@ -2940,7 +2940,7 @@
           <a:p>
             <a:fld id="{B9614994-C529-43AC-BD2C-52D47B0301A5}" type="datetimeFigureOut">
               <a:rPr lang="zh-CN" altLang="en-US" smtClean="0"/>
-              <a:t>2018/9/27</a:t>
+              <a:t>2018/9/28</a:t>
             </a:fld>
             <a:endParaRPr lang="zh-CN" altLang="en-US"/>
           </a:p>
@@ -3205,7 +3205,7 @@
           <a:p>
             <a:fld id="{B9614994-C529-43AC-BD2C-52D47B0301A5}" type="datetimeFigureOut">
               <a:rPr lang="zh-CN" altLang="en-US" smtClean="0"/>
-              <a:t>2018/9/27</a:t>
+              <a:t>2018/9/28</a:t>
             </a:fld>
             <a:endParaRPr lang="zh-CN" altLang="en-US"/>
           </a:p>
@@ -3617,7 +3617,7 @@
           <a:p>
             <a:fld id="{B9614994-C529-43AC-BD2C-52D47B0301A5}" type="datetimeFigureOut">
               <a:rPr lang="zh-CN" altLang="en-US" smtClean="0"/>
-              <a:t>2018/9/27</a:t>
+              <a:t>2018/9/28</a:t>
             </a:fld>
             <a:endParaRPr lang="zh-CN" altLang="en-US"/>
           </a:p>
@@ -3758,7 +3758,7 @@
           <a:p>
             <a:fld id="{B9614994-C529-43AC-BD2C-52D47B0301A5}" type="datetimeFigureOut">
               <a:rPr lang="zh-CN" altLang="en-US" smtClean="0"/>
-              <a:t>2018/9/27</a:t>
+              <a:t>2018/9/28</a:t>
             </a:fld>
             <a:endParaRPr lang="zh-CN" altLang="en-US"/>
           </a:p>
@@ -3871,7 +3871,7 @@
           <a:p>
             <a:fld id="{B9614994-C529-43AC-BD2C-52D47B0301A5}" type="datetimeFigureOut">
               <a:rPr lang="zh-CN" altLang="en-US" smtClean="0"/>
-              <a:t>2018/9/27</a:t>
+              <a:t>2018/9/28</a:t>
             </a:fld>
             <a:endParaRPr lang="zh-CN" altLang="en-US"/>
           </a:p>
@@ -4182,7 +4182,7 @@
           <a:p>
             <a:fld id="{B9614994-C529-43AC-BD2C-52D47B0301A5}" type="datetimeFigureOut">
               <a:rPr lang="zh-CN" altLang="en-US" smtClean="0"/>
-              <a:t>2018/9/27</a:t>
+              <a:t>2018/9/28</a:t>
             </a:fld>
             <a:endParaRPr lang="zh-CN" altLang="en-US"/>
           </a:p>
@@ -4470,7 +4470,7 @@
           <a:p>
             <a:fld id="{B9614994-C529-43AC-BD2C-52D47B0301A5}" type="datetimeFigureOut">
               <a:rPr lang="zh-CN" altLang="en-US" smtClean="0"/>
-              <a:t>2018/9/27</a:t>
+              <a:t>2018/9/28</a:t>
             </a:fld>
             <a:endParaRPr lang="zh-CN" altLang="en-US"/>
           </a:p>
@@ -4711,7 +4711,7 @@
           <a:p>
             <a:fld id="{B9614994-C529-43AC-BD2C-52D47B0301A5}" type="datetimeFigureOut">
               <a:rPr lang="zh-CN" altLang="en-US" smtClean="0"/>
-              <a:t>2018/9/27</a:t>
+              <a:t>2018/9/28</a:t>
             </a:fld>
             <a:endParaRPr lang="zh-CN" altLang="en-US"/>
           </a:p>

</xml_diff>